<commit_message>
remove use of B3 MCB
</commit_message>
<xml_diff>
--- a/10ma-rcbo-mcb-and-anti-external-cb-trip/10ma-rcbo-mcb-and-anti-external-cb-trip.pptx
+++ b/10ma-rcbo-mcb-and-anti-external-cb-trip/10ma-rcbo-mcb-and-anti-external-cb-trip.pptx
@@ -243,7 +243,7 @@
           <a:p>
             <a:fld id="{00808A92-602D-7A4F-BD0D-BC2312DEE103}" type="datetimeFigureOut">
               <a:rPr lang="en-US" smtClean="0"/>
-              <a:t>8/17/2016</a:t>
+              <a:t>9/23/2016</a:t>
             </a:fld>
             <a:endParaRPr lang="en-US"/>
           </a:p>
@@ -413,7 +413,7 @@
           <a:p>
             <a:fld id="{00808A92-602D-7A4F-BD0D-BC2312DEE103}" type="datetimeFigureOut">
               <a:rPr lang="en-US" smtClean="0"/>
-              <a:t>8/17/2016</a:t>
+              <a:t>9/23/2016</a:t>
             </a:fld>
             <a:endParaRPr lang="en-US"/>
           </a:p>
@@ -593,7 +593,7 @@
           <a:p>
             <a:fld id="{00808A92-602D-7A4F-BD0D-BC2312DEE103}" type="datetimeFigureOut">
               <a:rPr lang="en-US" smtClean="0"/>
-              <a:t>8/17/2016</a:t>
+              <a:t>9/23/2016</a:t>
             </a:fld>
             <a:endParaRPr lang="en-US"/>
           </a:p>
@@ -763,7 +763,7 @@
           <a:p>
             <a:fld id="{00808A92-602D-7A4F-BD0D-BC2312DEE103}" type="datetimeFigureOut">
               <a:rPr lang="en-US" smtClean="0"/>
-              <a:t>8/17/2016</a:t>
+              <a:t>9/23/2016</a:t>
             </a:fld>
             <a:endParaRPr lang="en-US"/>
           </a:p>
@@ -1007,7 +1007,7 @@
           <a:p>
             <a:fld id="{00808A92-602D-7A4F-BD0D-BC2312DEE103}" type="datetimeFigureOut">
               <a:rPr lang="en-US" smtClean="0"/>
-              <a:t>8/17/2016</a:t>
+              <a:t>9/23/2016</a:t>
             </a:fld>
             <a:endParaRPr lang="en-US"/>
           </a:p>
@@ -1239,7 +1239,7 @@
           <a:p>
             <a:fld id="{00808A92-602D-7A4F-BD0D-BC2312DEE103}" type="datetimeFigureOut">
               <a:rPr lang="en-US" smtClean="0"/>
-              <a:t>8/17/2016</a:t>
+              <a:t>9/23/2016</a:t>
             </a:fld>
             <a:endParaRPr lang="en-US"/>
           </a:p>
@@ -1606,7 +1606,7 @@
           <a:p>
             <a:fld id="{00808A92-602D-7A4F-BD0D-BC2312DEE103}" type="datetimeFigureOut">
               <a:rPr lang="en-US" smtClean="0"/>
-              <a:t>8/17/2016</a:t>
+              <a:t>9/23/2016</a:t>
             </a:fld>
             <a:endParaRPr lang="en-US"/>
           </a:p>
@@ -1724,7 +1724,7 @@
           <a:p>
             <a:fld id="{00808A92-602D-7A4F-BD0D-BC2312DEE103}" type="datetimeFigureOut">
               <a:rPr lang="en-US" smtClean="0"/>
-              <a:t>8/17/2016</a:t>
+              <a:t>9/23/2016</a:t>
             </a:fld>
             <a:endParaRPr lang="en-US"/>
           </a:p>
@@ -1819,7 +1819,7 @@
           <a:p>
             <a:fld id="{00808A92-602D-7A4F-BD0D-BC2312DEE103}" type="datetimeFigureOut">
               <a:rPr lang="en-US" smtClean="0"/>
-              <a:t>8/17/2016</a:t>
+              <a:t>9/23/2016</a:t>
             </a:fld>
             <a:endParaRPr lang="en-US"/>
           </a:p>
@@ -2096,7 +2096,7 @@
           <a:p>
             <a:fld id="{00808A92-602D-7A4F-BD0D-BC2312DEE103}" type="datetimeFigureOut">
               <a:rPr lang="en-US" smtClean="0"/>
-              <a:t>8/17/2016</a:t>
+              <a:t>9/23/2016</a:t>
             </a:fld>
             <a:endParaRPr lang="en-US"/>
           </a:p>
@@ -2353,7 +2353,7 @@
           <a:p>
             <a:fld id="{00808A92-602D-7A4F-BD0D-BC2312DEE103}" type="datetimeFigureOut">
               <a:rPr lang="en-US" smtClean="0"/>
-              <a:t>8/17/2016</a:t>
+              <a:t>9/23/2016</a:t>
             </a:fld>
             <a:endParaRPr lang="en-US"/>
           </a:p>
@@ -2566,7 +2566,7 @@
           <a:p>
             <a:fld id="{00808A92-602D-7A4F-BD0D-BC2312DEE103}" type="datetimeFigureOut">
               <a:rPr lang="en-US" smtClean="0"/>
-              <a:t>8/17/2016</a:t>
+              <a:t>9/23/2016</a:t>
             </a:fld>
             <a:endParaRPr lang="en-US"/>
           </a:p>
@@ -2973,7 +2973,7 @@
       </p:grpSpPr>
       <p:pic>
         <p:nvPicPr>
-          <p:cNvPr id="8" name="Picture 7"/>
+          <p:cNvPr id="2" name="Picture 1"/>
           <p:cNvPicPr>
             <a:picLocks noChangeAspect="1"/>
           </p:cNvPicPr>
@@ -2987,8 +2987,8 @@
         </p:blipFill>
         <p:spPr>
           <a:xfrm>
-            <a:off x="35491" y="1542275"/>
-            <a:ext cx="4572676" cy="1467929"/>
+            <a:off x="112528" y="1542275"/>
+            <a:ext cx="5197838" cy="1419224"/>
           </a:xfrm>
           <a:prstGeom prst="rect">
             <a:avLst/>
@@ -3103,7 +3103,7 @@
                 <a:ea typeface="Helvetica" charset="0"/>
                 <a:cs typeface="Helvetica" charset="0"/>
               </a:rPr>
-              <a:t>Only the 10mA RCCB should trip</a:t>
+              <a:t>Only the 10mA RCCB should trip.</a:t>
             </a:r>
           </a:p>
           <a:p>
@@ -3194,7 +3194,7 @@
                 <a:ea typeface="Helvetica" charset="0"/>
                 <a:cs typeface="Helvetica" charset="0"/>
               </a:rPr>
-              <a:t>5. If the “B3 MCB” keeps tripping due to high-current appliance, you can temporarily engage the “Bypass B3 MCB” switch.</a:t>
+              <a:t>5. If the “B6 MCB” keeps tripping due to high-current appliance, you can temporarily engage the “Bypass B6 MCB” switch.</a:t>
             </a:r>
           </a:p>
         </p:txBody>

</xml_diff>